<commit_message>
Updated authorization presentation to allow for lab slides to be hidden while still maintaining flow.
</commit_message>
<xml_diff>
--- a/authorization/smart-authorization-presentation-july-2017.pptx
+++ b/authorization/smart-authorization-presentation-july-2017.pptx
@@ -256,7 +256,7 @@
             <p14:sldId id="413"/>
           </p14:sldIdLst>
         </p14:section>
-        <p14:section name="Authorization Code Flow Recap" id="{041A7A68-BDE4-4E0D-8A05-394502BC6D63}">
+        <p14:section name="Authorization Code Flow" id="{041A7A68-BDE4-4E0D-8A05-394502BC6D63}">
           <p14:sldIdLst>
             <p14:sldId id="455"/>
             <p14:sldId id="500"/>
@@ -528,7 +528,7 @@
           <a:p>
             <a:fld id="{5943B5BA-8FE1-4769-B5B1-BD8C362CA2D3}" type="datetimeFigureOut">
               <a:rPr lang="en-US" smtClean="0"/>
-              <a:t>7/26/2017</a:t>
+              <a:t>10/10/2017</a:t>
             </a:fld>
             <a:endParaRPr lang="en-US"/>
           </a:p>
@@ -8644,7 +8644,7 @@
           <a:p>
             <a:fld id="{DC509093-0A88-4CE0-881F-99629760210A}" type="datetimeFigureOut">
               <a:rPr lang="en-US" smtClean="0"/>
-              <a:t>7/26/2017</a:t>
+              <a:t>10/10/2017</a:t>
             </a:fld>
             <a:endParaRPr lang="en-US"/>
           </a:p>
@@ -12595,7 +12595,7 @@
           <a:p>
             <a:r>
               <a:rPr lang="en-US" dirty="0"/>
-              <a:t>Authorization Code Flow Recap</a:t>
+              <a:t>Authorization Code Flow</a:t>
             </a:r>
           </a:p>
         </p:txBody>
@@ -12647,7 +12647,7 @@
           <a:p>
             <a:r>
               <a:rPr lang="en-US" dirty="0"/>
-              <a:t>Authorization Code Flow Recap</a:t>
+              <a:t>Authorization Code Flow</a:t>
             </a:r>
           </a:p>
         </p:txBody>
@@ -12665,7 +12665,7 @@
         <p:spPr/>
         <p:txBody>
           <a:bodyPr>
-            <a:normAutofit/>
+            <a:normAutofit lnSpcReduction="10000"/>
           </a:bodyPr>
           <a:lstStyle/>
           <a:p>
@@ -12674,7 +12674,7 @@
             </a:pPr>
             <a:r>
               <a:rPr lang="en-US" dirty="0"/>
-              <a:t>Steps:</a:t>
+              <a:t>High-level steps:</a:t>
             </a:r>
           </a:p>
           <a:p>
@@ -12683,13 +12683,19 @@
           <a:p>
             <a:r>
               <a:rPr lang="en-US" dirty="0"/>
-              <a:t>Construct the authorization request URL.</a:t>
+              <a:t>Construct an authorization request URL.</a:t>
             </a:r>
           </a:p>
           <a:p>
             <a:r>
               <a:rPr lang="en-US" dirty="0"/>
               <a:t>Open the URL in an appropriate user-agent.</a:t>
+            </a:r>
+          </a:p>
+          <a:p>
+            <a:r>
+              <a:rPr lang="en-US" dirty="0"/>
+              <a:t>User / user-agent interaction occurs.</a:t>
             </a:r>
           </a:p>
           <a:p>
@@ -13045,6 +13051,55 @@
                       </p:childTnLst>
                     </p:cTn>
                   </p:par>
+                  <p:par>
+                    <p:cTn id="27" fill="hold">
+                      <p:stCondLst>
+                        <p:cond delay="indefinite"/>
+                      </p:stCondLst>
+                      <p:childTnLst>
+                        <p:par>
+                          <p:cTn id="28" fill="hold">
+                            <p:stCondLst>
+                              <p:cond delay="0"/>
+                            </p:stCondLst>
+                            <p:childTnLst>
+                              <p:par>
+                                <p:cTn id="29" presetID="1" presetClass="entr" presetSubtype="0" fill="hold" nodeType="clickEffect">
+                                  <p:stCondLst>
+                                    <p:cond delay="0"/>
+                                  </p:stCondLst>
+                                  <p:childTnLst>
+                                    <p:set>
+                                      <p:cBhvr>
+                                        <p:cTn id="30" dur="1" fill="hold">
+                                          <p:stCondLst>
+                                            <p:cond delay="0"/>
+                                          </p:stCondLst>
+                                        </p:cTn>
+                                        <p:tgtEl>
+                                          <p:spTgt spid="4">
+                                            <p:txEl>
+                                              <p:pRg st="8" end="8"/>
+                                            </p:txEl>
+                                          </p:spTgt>
+                                        </p:tgtEl>
+                                        <p:attrNameLst>
+                                          <p:attrName>style.visibility</p:attrName>
+                                        </p:attrNameLst>
+                                      </p:cBhvr>
+                                      <p:to>
+                                        <p:strVal val="visible"/>
+                                      </p:to>
+                                    </p:set>
+                                  </p:childTnLst>
+                                </p:cTn>
+                              </p:par>
+                            </p:childTnLst>
+                          </p:cTn>
+                        </p:par>
+                      </p:childTnLst>
+                    </p:cTn>
+                  </p:par>
                 </p:childTnLst>
               </p:cTn>
               <p:prevCondLst>
@@ -13194,7 +13249,7 @@
           <a:p>
             <a:r>
               <a:rPr lang="en-US" dirty="0"/>
-              <a:t>Authorization Code Flow Recap</a:t>
+              <a:t>Authorization Code Flow</a:t>
             </a:r>
           </a:p>
         </p:txBody>
@@ -13287,7 +13342,7 @@
           <a:p>
             <a:r>
               <a:rPr lang="en-US" dirty="0"/>
-              <a:t>Authorization Code Flow Recap</a:t>
+              <a:t>Authorization Code Flow</a:t>
             </a:r>
           </a:p>
         </p:txBody>
@@ -13448,7 +13503,7 @@
           <a:p>
             <a:r>
               <a:rPr lang="en-US" dirty="0"/>
-              <a:t>Authorization Code Flow Recap</a:t>
+              <a:t>Authorization Code Flow</a:t>
             </a:r>
           </a:p>
         </p:txBody>
@@ -13557,7 +13612,7 @@
           <a:p>
             <a:r>
               <a:rPr lang="en-US" dirty="0"/>
-              <a:t>Authorization Code Flow Recap</a:t>
+              <a:t>Authorization Code Flow</a:t>
             </a:r>
           </a:p>
         </p:txBody>
@@ -13683,7 +13738,7 @@
           <a:p>
             <a:r>
               <a:rPr lang="en-US" dirty="0"/>
-              <a:t>Authorization Code Flow Recap</a:t>
+              <a:t>Authorization Code Flow</a:t>
             </a:r>
           </a:p>
         </p:txBody>
@@ -13768,7 +13823,7 @@
           <a:p>
             <a:r>
               <a:rPr lang="en-US" dirty="0"/>
-              <a:t>Authorization Code Flow Recap</a:t>
+              <a:t>Authorization Code Flow</a:t>
             </a:r>
           </a:p>
         </p:txBody>
@@ -13917,7 +13972,7 @@
           <a:p>
             <a:r>
               <a:rPr lang="en-US" dirty="0"/>
-              <a:t>Authorization Code Flow Recap</a:t>
+              <a:t>Authorization Code Flow</a:t>
             </a:r>
           </a:p>
         </p:txBody>
@@ -14041,7 +14096,7 @@
           <a:p>
             <a:r>
               <a:rPr lang="en-US" dirty="0"/>
-              <a:t>Authorization Code Flow Recap</a:t>
+              <a:t>Authorization Code Flow</a:t>
             </a:r>
           </a:p>
         </p:txBody>
@@ -14155,7 +14210,7 @@
           <a:p>
             <a:r>
               <a:rPr lang="en-US" dirty="0"/>
-              <a:t>Authorization Code Flow Recap</a:t>
+              <a:t>Authorization Code Flow</a:t>
             </a:r>
           </a:p>
         </p:txBody>
@@ -14333,7 +14388,7 @@
           <a:p>
             <a:r>
               <a:rPr lang="en-US" dirty="0"/>
-              <a:t>Authorization Code Flow Recap</a:t>
+              <a:t>Authorization Code Flow</a:t>
             </a:r>
           </a:p>
         </p:txBody>
@@ -14470,7 +14525,7 @@
           <a:p>
             <a:r>
               <a:rPr lang="en-US" dirty="0"/>
-              <a:t>Authorization Code Flow Recap</a:t>
+              <a:t>Authorization Code Flow</a:t>
             </a:r>
           </a:p>
         </p:txBody>

</xml_diff>